<commit_message>
poster v3 (integrated suggestions of tamas)
</commit_message>
<xml_diff>
--- a/report_poster/p1_poster.pptx
+++ b/report_poster/p1_poster.pptx
@@ -11734,7 +11734,7 @@
               </a:r>
               <a:r>
                 <a:rPr lang="en-GB" sz="1200" dirty="0"/>
-                <a:t>, an interactive, responsive and accessible website designed for individuals seeking a comprehensive overview of happiness across the globe. Using the World Happiness Index, we ranked countries based on their happiness scores, providing an engaging experience through a dynamic map where users can explore and compare the happiness levels of different nations.</a:t>
+                <a:t>, an interactive, responsive and accessible website designed for individuals seeking a comprehensive overview of happiness across the globe. Using the World Happiness Index, we ranked countries based on their happiness scores, providing an engaging experience through a dynamic map where users can explore and compare the happiness levels of different nations across time.</a:t>
               </a:r>
             </a:p>
           </p:txBody>
@@ -12438,7 +12438,7 @@
         </p:blipFill>
         <p:spPr>
           <a:xfrm>
-            <a:off x="9370343" y="1356747"/>
+            <a:off x="4373506" y="1536871"/>
             <a:ext cx="829013" cy="829013"/>
           </a:xfrm>
           <a:prstGeom prst="rect">
@@ -12885,7 +12885,7 @@
                 </a:r>
                 <a:r>
                   <a:rPr lang="en-GB" sz="1200" dirty="0"/>
-                  <a:t>, complemented by custom-designed elements seamlessly aligned with the </a:t>
+                  <a:t>, complemented by custom-designed elements aligned with the </a:t>
                 </a:r>
                 <a:r>
                   <a:rPr lang="en-GB" sz="1200" dirty="0" err="1"/>
@@ -12922,7 +12922,7 @@
                 </a:r>
                 <a:r>
                   <a:rPr lang="en-GB" sz="1200" dirty="0"/>
-                  <a:t>, providing a robust and scalable infrastructure, seamlessly integrating database management and API capabilities to support the website’s dynamic functionality.</a:t>
+                  <a:t>, providing a robust and scalable infrastructure, integrating database management and API capabilities to support the website’s dynamic functionality.</a:t>
                 </a:r>
               </a:p>
             </p:txBody>
@@ -13077,7 +13077,7 @@
               </a:pPr>
               <a:r>
                 <a:rPr lang="en-GB" sz="1200" dirty="0"/>
-                <a:t>We designed the website with a focus on consistency and inclusivity, utilizing the sleek components of </a:t>
+                <a:t>We designed the website with a focus on consistency and inclusion, utilizing the sleek components of </a:t>
               </a:r>
               <a:r>
                 <a:rPr lang="en-GB" sz="1200" dirty="0" err="1"/>
@@ -13101,7 +13101,7 @@
               </a:r>
               <a:r>
                 <a:rPr lang="en-GB" sz="1200" dirty="0"/>
-                <a:t> stage, featuring an engaging custom map for dynamic exploration and interaction. To ensure accessibility for all users, we implemented robust keyboard navigation and accessibility features, making the website inclusive and easy to use for everyone.</a:t>
+                <a:t> stage, featuring an engaging custom map for dynamic exploration and interaction. To ensure accessibility for all users, we implemented robust keyboard navigation and accessibility features in diagrams, making the website inclusive and easy to use for everyone.</a:t>
               </a:r>
             </a:p>
           </p:txBody>

</xml_diff>

<commit_message>
poster v4 (final version)
</commit_message>
<xml_diff>
--- a/report_poster/p1_poster.pptx
+++ b/report_poster/p1_poster.pptx
@@ -242,7 +242,7 @@
           <a:p>
             <a:fld id="{F68ABEA4-9216-4FDF-AAE1-D8632908A8EC}" type="datetimeFigureOut">
               <a:rPr lang="de-CH" smtClean="0"/>
-              <a:t>15.12.2024</a:t>
+              <a:t>17.12.2024</a:t>
             </a:fld>
             <a:endParaRPr lang="de-CH"/>
           </a:p>
@@ -419,7 +419,7 @@
           <a:p>
             <a:fld id="{4B78A90D-FE7E-41AF-B03D-808D82937CB9}" type="datetimeFigureOut">
               <a:rPr lang="de-CH" smtClean="0"/>
-              <a:t>15.12.2024</a:t>
+              <a:t>17.12.2024</a:t>
             </a:fld>
             <a:endParaRPr lang="de-CH"/>
           </a:p>
@@ -11700,8 +11700,8 @@
           </p:nvSpPr>
           <p:spPr>
             <a:xfrm>
-              <a:off x="447506" y="3861959"/>
-              <a:ext cx="4788000" cy="1868534"/>
+              <a:off x="447506" y="3851275"/>
+              <a:ext cx="4788000" cy="1879218"/>
             </a:xfrm>
             <a:prstGeom prst="rect">
               <a:avLst/>
@@ -11854,10 +11854,10 @@
         </p:nvGrpSpPr>
         <p:grpSpPr>
           <a:xfrm>
-            <a:off x="5463971" y="9485817"/>
-            <a:ext cx="4793171" cy="3215127"/>
-            <a:chOff x="5451599" y="8862573"/>
-            <a:chExt cx="4793171" cy="3215127"/>
+            <a:off x="5454651" y="9485817"/>
+            <a:ext cx="4802491" cy="3215127"/>
+            <a:chOff x="5442279" y="8862573"/>
+            <a:chExt cx="4802491" cy="3215127"/>
           </a:xfrm>
         </p:grpSpPr>
         <p:sp>
@@ -11874,8 +11874,8 @@
           </p:nvSpPr>
           <p:spPr>
             <a:xfrm>
-              <a:off x="5451599" y="9262044"/>
-              <a:ext cx="4788000" cy="2815656"/>
+              <a:off x="5442279" y="9262044"/>
+              <a:ext cx="4787900" cy="2815656"/>
             </a:xfrm>
             <a:prstGeom prst="rect">
               <a:avLst/>
@@ -12063,9 +12063,9 @@
         <p:grpSpPr>
           <a:xfrm>
             <a:off x="5451599" y="12703991"/>
-            <a:ext cx="4793171" cy="1384914"/>
+            <a:ext cx="4793171" cy="1372372"/>
             <a:chOff x="5451599" y="12703991"/>
-            <a:chExt cx="4793171" cy="1384914"/>
+            <a:chExt cx="4793171" cy="1372372"/>
           </a:xfrm>
         </p:grpSpPr>
         <p:sp>
@@ -12132,8 +12132,8 @@
           </p:nvSpPr>
           <p:spPr>
             <a:xfrm>
-              <a:off x="5451737" y="13116905"/>
-              <a:ext cx="3601613" cy="972000"/>
+              <a:off x="5454650" y="13116905"/>
+              <a:ext cx="3598700" cy="959458"/>
             </a:xfrm>
             <a:prstGeom prst="rect">
               <a:avLst/>
@@ -12163,8 +12163,16 @@
                 <a:t>To visit our website, follow this link: </a:t>
               </a:r>
               <a:r>
-                <a:rPr lang="en-GB" sz="700" b="1" u="sng" dirty="0"/>
-                <a:t>Filler</a:t>
+                <a:rPr lang="en-GB" sz="700" dirty="0">
+                  <a:hlinkClick r:id="rId2">
+                    <a:extLst>
+                      <a:ext uri="{A12FA001-AC4F-418D-AE19-62706E023703}">
+                        <ahyp:hlinkClr xmlns:ahyp="http://schemas.microsoft.com/office/drawing/2018/hyperlinkcolor" val="tx"/>
+                      </a:ext>
+                    </a:extLst>
+                  </a:hlinkClick>
+                </a:rPr>
+                <a:t>https://happiness-explorer.vercel.app/</a:t>
               </a:r>
               <a:r>
                 <a:rPr lang="en-GB" sz="700" dirty="0"/>
@@ -12181,7 +12189,7 @@
               </a:pPr>
               <a:r>
                 <a:rPr lang="en-GB" sz="700" dirty="0">
-                  <a:hlinkClick r:id="rId2">
+                  <a:hlinkClick r:id="rId3">
                     <a:extLst>
                       <a:ext uri="{A12FA001-AC4F-418D-AE19-62706E023703}">
                         <ahyp:hlinkClr xmlns:ahyp="http://schemas.microsoft.com/office/drawing/2018/hyperlinkcolor" val="tx"/>
@@ -12203,7 +12211,7 @@
               </a:pPr>
               <a:r>
                 <a:rPr lang="en-GB" sz="700" dirty="0">
-                  <a:hlinkClick r:id="rId3">
+                  <a:hlinkClick r:id="rId4">
                     <a:extLst>
                       <a:ext uri="{A12FA001-AC4F-418D-AE19-62706E023703}">
                         <ahyp:hlinkClr xmlns:ahyp="http://schemas.microsoft.com/office/drawing/2018/hyperlinkcolor" val="tx"/>
@@ -12225,7 +12233,7 @@
               </a:pPr>
               <a:r>
                 <a:rPr lang="en-GB" sz="700" dirty="0">
-                  <a:hlinkClick r:id="rId4">
+                  <a:hlinkClick r:id="rId5">
                     <a:extLst>
                       <a:ext uri="{A12FA001-AC4F-418D-AE19-62706E023703}">
                         <ahyp:hlinkClr xmlns:ahyp="http://schemas.microsoft.com/office/drawing/2018/hyperlinkcolor" val="tx"/>
@@ -12244,68 +12252,6 @@
                 </a:spcAft>
               </a:pPr>
               <a:endParaRPr lang="en-GB" sz="700" dirty="0"/>
-            </a:p>
-          </p:txBody>
-        </p:sp>
-        <p:sp>
-          <p:nvSpPr>
-            <p:cNvPr id="33" name="Rectangle 32">
-              <a:extLst>
-                <a:ext uri="{FF2B5EF4-FFF2-40B4-BE49-F238E27FC236}">
-                  <a16:creationId xmlns:a16="http://schemas.microsoft.com/office/drawing/2014/main" id="{E010FC5E-EBE0-6818-5ADF-621FE538FFEF}"/>
-                </a:ext>
-              </a:extLst>
-            </p:cNvPr>
-            <p:cNvSpPr/>
-            <p:nvPr/>
-          </p:nvSpPr>
-          <p:spPr>
-            <a:xfrm>
-              <a:off x="9267599" y="13105265"/>
-              <a:ext cx="972000" cy="972000"/>
-            </a:xfrm>
-            <a:prstGeom prst="rect">
-              <a:avLst/>
-            </a:prstGeom>
-            <a:blipFill dpi="0" rotWithShape="1">
-              <a:blip r:embed="rId5">
-                <a:extLst>
-                  <a:ext uri="{28A0092B-C50C-407E-A947-70E740481C1C}">
-                    <a14:useLocalDpi xmlns:a14="http://schemas.microsoft.com/office/drawing/2010/main" val="0"/>
-                  </a:ext>
-                </a:extLst>
-              </a:blip>
-              <a:srcRect/>
-              <a:stretch>
-                <a:fillRect/>
-              </a:stretch>
-            </a:blipFill>
-            <a:ln>
-              <a:noFill/>
-            </a:ln>
-          </p:spPr>
-          <p:style>
-            <a:lnRef idx="2">
-              <a:schemeClr val="accent6">
-                <a:shade val="15000"/>
-              </a:schemeClr>
-            </a:lnRef>
-            <a:fillRef idx="1">
-              <a:schemeClr val="accent6"/>
-            </a:fillRef>
-            <a:effectRef idx="0">
-              <a:schemeClr val="accent6"/>
-            </a:effectRef>
-            <a:fontRef idx="minor">
-              <a:schemeClr val="lt1"/>
-            </a:fontRef>
-          </p:style>
-          <p:txBody>
-            <a:bodyPr rtlCol="0" anchor="ctr"/>
-            <a:lstStyle/>
-            <a:p>
-              <a:pPr algn="ctr"/>
-              <a:endParaRPr lang="en-GB" dirty="0"/>
             </a:p>
           </p:txBody>
         </p:sp>
@@ -12570,7 +12516,7 @@
           <p:spPr>
             <a:xfrm>
               <a:off x="5456307" y="3862366"/>
-              <a:ext cx="4788000" cy="4801971"/>
+              <a:ext cx="4780243" cy="4801972"/>
             </a:xfrm>
             <a:prstGeom prst="rect">
               <a:avLst/>
@@ -13049,8 +12995,8 @@
           </p:nvSpPr>
           <p:spPr>
             <a:xfrm>
-              <a:off x="453970" y="9580564"/>
-              <a:ext cx="4788000" cy="5621303"/>
+              <a:off x="453970" y="9572176"/>
+              <a:ext cx="4788000" cy="5629692"/>
             </a:xfrm>
             <a:prstGeom prst="rect">
               <a:avLst/>
@@ -13156,41 +13102,6 @@
             </a:p>
           </p:txBody>
         </p:sp>
-        <p:pic>
-          <p:nvPicPr>
-            <p:cNvPr id="82" name="Grafik 31" descr="Image outline">
-              <a:extLst>
-                <a:ext uri="{FF2B5EF4-FFF2-40B4-BE49-F238E27FC236}">
-                  <a16:creationId xmlns:a16="http://schemas.microsoft.com/office/drawing/2014/main" id="{B427BDE6-EDB5-3E46-D572-CCFD812D0C56}"/>
-                </a:ext>
-              </a:extLst>
-            </p:cNvPr>
-            <p:cNvPicPr>
-              <a:picLocks noChangeAspect="1"/>
-            </p:cNvPicPr>
-            <p:nvPr/>
-          </p:nvPicPr>
-          <p:blipFill>
-            <a:blip r:embed="rId10">
-              <a:extLst>
-                <a:ext uri="{96DAC541-7B7A-43D3-8B79-37D633B846F1}">
-                  <asvg:svgBlip xmlns:asvg="http://schemas.microsoft.com/office/drawing/2016/SVG/main" r:embed="rId11"/>
-                </a:ext>
-              </a:extLst>
-            </a:blip>
-            <a:srcRect t="15273" b="15273"/>
-            <a:stretch/>
-          </p:blipFill>
-          <p:spPr>
-            <a:xfrm>
-              <a:off x="899204" y="11863520"/>
-              <a:ext cx="3878502" cy="2693802"/>
-            </a:xfrm>
-            <a:prstGeom prst="rect">
-              <a:avLst/>
-            </a:prstGeom>
-          </p:spPr>
-        </p:pic>
         <p:sp>
           <p:nvSpPr>
             <p:cNvPr id="83" name="Textfeld 27">
@@ -13224,7 +13135,15 @@
             <a:p>
               <a:r>
                 <a:rPr lang="en-GB" sz="700" dirty="0"/>
-                <a:t>Visual of website</a:t>
+                <a:t>Landing page of </a:t>
+              </a:r>
+              <a:r>
+                <a:rPr lang="en-GB" sz="700" i="1" dirty="0"/>
+                <a:t>Smiling Globe</a:t>
+              </a:r>
+              <a:r>
+                <a:rPr lang="en-GB" sz="700" dirty="0"/>
+                <a:t> with report of 2024 selected.</a:t>
               </a:r>
             </a:p>
           </p:txBody>
@@ -13280,6 +13199,107 @@
           </p:txBody>
         </p:sp>
       </p:grpSp>
+      <p:pic>
+        <p:nvPicPr>
+          <p:cNvPr id="8" name="Picture 7" descr="A black and white rectangle with a black background&#10;&#10;Description automatically generated">
+            <a:extLst>
+              <a:ext uri="{FF2B5EF4-FFF2-40B4-BE49-F238E27FC236}">
+                <a16:creationId xmlns:a16="http://schemas.microsoft.com/office/drawing/2014/main" id="{6A4DD4F8-BCC3-74B9-95E6-C840522FC92A}"/>
+              </a:ext>
+            </a:extLst>
+          </p:cNvPr>
+          <p:cNvPicPr>
+            <a:picLocks noChangeAspect="1"/>
+          </p:cNvPicPr>
+          <p:nvPr/>
+        </p:nvPicPr>
+        <p:blipFill>
+          <a:blip r:embed="rId10">
+            <a:extLst>
+              <a:ext uri="{28A0092B-C50C-407E-A947-70E740481C1C}">
+                <a14:useLocalDpi xmlns:a14="http://schemas.microsoft.com/office/drawing/2010/main" val="0"/>
+              </a:ext>
+            </a:extLst>
+          </a:blip>
+          <a:stretch>
+            <a:fillRect/>
+          </a:stretch>
+        </p:blipFill>
+        <p:spPr>
+          <a:xfrm>
+            <a:off x="1765912" y="14350540"/>
+            <a:ext cx="1188953" cy="330438"/>
+          </a:xfrm>
+          <a:prstGeom prst="rect">
+            <a:avLst/>
+          </a:prstGeom>
+        </p:spPr>
+      </p:pic>
+      <p:pic>
+        <p:nvPicPr>
+          <p:cNvPr id="10" name="Graphic 9">
+            <a:extLst>
+              <a:ext uri="{FF2B5EF4-FFF2-40B4-BE49-F238E27FC236}">
+                <a16:creationId xmlns:a16="http://schemas.microsoft.com/office/drawing/2014/main" id="{1293B3B5-0BBD-EB8F-1EB6-440360B98F0E}"/>
+              </a:ext>
+            </a:extLst>
+          </p:cNvPr>
+          <p:cNvPicPr>
+            <a:picLocks noChangeAspect="1"/>
+          </p:cNvPicPr>
+          <p:nvPr/>
+        </p:nvPicPr>
+        <p:blipFill>
+          <a:blip r:embed="rId11">
+            <a:extLst>
+              <a:ext uri="{96DAC541-7B7A-43D3-8B79-37D633B846F1}">
+                <asvg:svgBlip xmlns:asvg="http://schemas.microsoft.com/office/drawing/2016/SVG/main" r:embed="rId12"/>
+              </a:ext>
+            </a:extLst>
+          </a:blip>
+          <a:stretch>
+            <a:fillRect/>
+          </a:stretch>
+        </p:blipFill>
+        <p:spPr>
+          <a:xfrm>
+            <a:off x="9279052" y="13116905"/>
+            <a:ext cx="960035" cy="960035"/>
+          </a:xfrm>
+          <a:prstGeom prst="rect">
+            <a:avLst/>
+          </a:prstGeom>
+        </p:spPr>
+      </p:pic>
+      <p:pic>
+        <p:nvPicPr>
+          <p:cNvPr id="4" name="Picture 3">
+            <a:extLst>
+              <a:ext uri="{FF2B5EF4-FFF2-40B4-BE49-F238E27FC236}">
+                <a16:creationId xmlns:a16="http://schemas.microsoft.com/office/drawing/2014/main" id="{04A2EFB5-6AFC-D3B0-C608-B684BD273E8E}"/>
+              </a:ext>
+            </a:extLst>
+          </p:cNvPr>
+          <p:cNvPicPr>
+            <a:picLocks noChangeAspect="1"/>
+          </p:cNvPicPr>
+          <p:nvPr/>
+        </p:nvPicPr>
+        <p:blipFill>
+          <a:blip r:embed="rId13"/>
+          <a:srcRect l="301" r="222"/>
+          <a:stretch/>
+        </p:blipFill>
+        <p:spPr>
+          <a:xfrm>
+            <a:off x="5756851" y="5952372"/>
+            <a:ext cx="4180899" cy="3144509"/>
+          </a:xfrm>
+          <a:prstGeom prst="rect">
+            <a:avLst/>
+          </a:prstGeom>
+        </p:spPr>
+      </p:pic>
     </p:spTree>
     <p:extLst>
       <p:ext uri="{BB962C8B-B14F-4D97-AF65-F5344CB8AC3E}">

</xml_diff>

<commit_message>
poster v4.1 (final final version)
</commit_message>
<xml_diff>
--- a/report_poster/p1_poster.pptx
+++ b/report_poster/p1_poster.pptx
@@ -12358,10 +12358,10 @@
       </p:sp>
       <p:pic>
         <p:nvPicPr>
-          <p:cNvPr id="40" name="Picture 39" descr="A cartoon face with a black background&#10;&#10;Description automatically generated">
-            <a:extLst>
-              <a:ext uri="{FF2B5EF4-FFF2-40B4-BE49-F238E27FC236}">
-                <a16:creationId xmlns:a16="http://schemas.microsoft.com/office/drawing/2014/main" id="{62F3894E-BF2E-EAEC-46FD-19CED948795A}"/>
+          <p:cNvPr id="70" name="Picture 69" descr="A black background with a black square&#10;&#10;Description automatically generated with medium confidence">
+            <a:extLst>
+              <a:ext uri="{FF2B5EF4-FFF2-40B4-BE49-F238E27FC236}">
+                <a16:creationId xmlns:a16="http://schemas.microsoft.com/office/drawing/2014/main" id="{2CC7FA3C-CA3B-8D04-0056-4D369F120021}"/>
               </a:ext>
             </a:extLst>
           </p:cNvPr>
@@ -12372,45 +12372,6 @@
         </p:nvPicPr>
         <p:blipFill>
           <a:blip r:embed="rId6">
-            <a:extLst>
-              <a:ext uri="{28A0092B-C50C-407E-A947-70E740481C1C}">
-                <a14:useLocalDpi xmlns:a14="http://schemas.microsoft.com/office/drawing/2010/main" val="0"/>
-              </a:ext>
-            </a:extLst>
-          </a:blip>
-          <a:stretch>
-            <a:fillRect/>
-          </a:stretch>
-        </p:blipFill>
-        <p:spPr>
-          <a:xfrm>
-            <a:off x="4373506" y="1536871"/>
-            <a:ext cx="829013" cy="829013"/>
-          </a:xfrm>
-          <a:prstGeom prst="rect">
-            <a:avLst/>
-          </a:prstGeom>
-          <a:ln>
-            <a:noFill/>
-          </a:ln>
-        </p:spPr>
-      </p:pic>
-      <p:pic>
-        <p:nvPicPr>
-          <p:cNvPr id="70" name="Picture 69" descr="A black background with a black square&#10;&#10;Description automatically generated with medium confidence">
-            <a:extLst>
-              <a:ext uri="{FF2B5EF4-FFF2-40B4-BE49-F238E27FC236}">
-                <a16:creationId xmlns:a16="http://schemas.microsoft.com/office/drawing/2014/main" id="{2CC7FA3C-CA3B-8D04-0056-4D369F120021}"/>
-              </a:ext>
-            </a:extLst>
-          </p:cNvPr>
-          <p:cNvPicPr>
-            <a:picLocks noChangeAspect="1"/>
-          </p:cNvPicPr>
-          <p:nvPr/>
-        </p:nvPicPr>
-        <p:blipFill>
-          <a:blip r:embed="rId7">
             <a:extLst>
               <a:ext uri="{28A0092B-C50C-407E-A947-70E740481C1C}">
                 <a14:useLocalDpi xmlns:a14="http://schemas.microsoft.com/office/drawing/2010/main" val="0"/>
@@ -12651,7 +12612,7 @@
             <p:nvPr/>
           </p:nvPicPr>
           <p:blipFill>
-            <a:blip r:embed="rId8">
+            <a:blip r:embed="rId7">
               <a:extLst>
                 <a:ext uri="{28A0092B-C50C-407E-A947-70E740481C1C}">
                   <a14:useLocalDpi xmlns:a14="http://schemas.microsoft.com/office/drawing/2010/main" val="0"/>
@@ -12939,7 +12900,7 @@
             <p:nvPr/>
           </p:nvPicPr>
           <p:blipFill>
-            <a:blip r:embed="rId9">
+            <a:blip r:embed="rId8">
               <a:extLst>
                 <a:ext uri="{28A0092B-C50C-407E-A947-70E740481C1C}">
                   <a14:useLocalDpi xmlns:a14="http://schemas.microsoft.com/office/drawing/2010/main" val="0"/>
@@ -13214,7 +13175,7 @@
           <p:nvPr/>
         </p:nvPicPr>
         <p:blipFill>
-          <a:blip r:embed="rId10">
+          <a:blip r:embed="rId9">
             <a:extLst>
               <a:ext uri="{28A0092B-C50C-407E-A947-70E740481C1C}">
                 <a14:useLocalDpi xmlns:a14="http://schemas.microsoft.com/office/drawing/2010/main" val="0"/>
@@ -13250,10 +13211,10 @@
           <p:nvPr/>
         </p:nvPicPr>
         <p:blipFill>
-          <a:blip r:embed="rId11">
+          <a:blip r:embed="rId10">
             <a:extLst>
               <a:ext uri="{96DAC541-7B7A-43D3-8B79-37D633B846F1}">
-                <asvg:svgBlip xmlns:asvg="http://schemas.microsoft.com/office/drawing/2016/SVG/main" r:embed="rId12"/>
+                <asvg:svgBlip xmlns:asvg="http://schemas.microsoft.com/office/drawing/2016/SVG/main" r:embed="rId11"/>
               </a:ext>
             </a:extLst>
           </a:blip>
@@ -13286,7 +13247,7 @@
           <p:nvPr/>
         </p:nvPicPr>
         <p:blipFill>
-          <a:blip r:embed="rId13"/>
+          <a:blip r:embed="rId12"/>
           <a:srcRect l="301" r="222"/>
           <a:stretch/>
         </p:blipFill>

</xml_diff>